<commit_message>
Update -DskipTests from the command
</commit_message>
<xml_diff>
--- a/platform/documentation/Platform_Installation_Guide_for_Linux.pptx
+++ b/platform/documentation/Platform_Installation_Guide_for_Linux.pptx
@@ -9631,15 +9631,23 @@
             </a:r>
           </a:p>
           <a:p>
-            <a:r>
-              <a:rPr lang="en-GB" dirty="0"/>
-              <a:t>Obtain platform bootstrap packages</a:t>
-            </a:r>
-          </a:p>
-          <a:p>
             <a:pPr marL="457200" lvl="1" indent="0">
               <a:buNone/>
             </a:pPr>
+            <a:endParaRPr lang="en-GB" dirty="0">
+              <a:latin typeface="Consolas" panose="020B0609020204030204" pitchFamily="49" charset="0"/>
+            </a:endParaRPr>
+          </a:p>
+          <a:p>
+            <a:r>
+              <a:rPr lang="en-GB" dirty="0"/>
+              <a:t>Obtain platform bootstrap packages</a:t>
+            </a:r>
+          </a:p>
+          <a:p>
+            <a:pPr marL="457200" lvl="1" indent="0">
+              <a:buNone/>
+            </a:pPr>
             <a:r>
               <a:rPr lang="en-GB" dirty="0">
                 <a:latin typeface="Consolas" panose="020B0609020204030204" pitchFamily="49" charset="0"/>
@@ -9663,18 +9671,6 @@
                 <a:latin typeface="Consolas" panose="020B0609020204030204" pitchFamily="49" charset="0"/>
               </a:rPr>
               <a:t>package</a:t>
-            </a:r>
-            <a:r>
-              <a:rPr lang="es-ES" dirty="0">
-                <a:latin typeface="Consolas" panose="020B0609020204030204" pitchFamily="49" charset="0"/>
-              </a:rPr>
-              <a:t> -</a:t>
-            </a:r>
-            <a:r>
-              <a:rPr lang="es-ES" dirty="0" err="1">
-                <a:latin typeface="Consolas" panose="020B0609020204030204" pitchFamily="49" charset="0"/>
-              </a:rPr>
-              <a:t>DskipTests</a:t>
             </a:r>
             <a:endParaRPr lang="es-ES" dirty="0">
               <a:latin typeface="Consolas" panose="020B0609020204030204" pitchFamily="49" charset="0"/>

</xml_diff>